<commit_message>
added forgotten service unit update tests
</commit_message>
<xml_diff>
--- a/Project documentation/TDL presentation.pptx
+++ b/Project documentation/TDL presentation.pptx
@@ -4600,8 +4600,8 @@
         </p:nvSpPr>
         <p:spPr>
           <a:xfrm>
-            <a:off x="1097280" y="4320422"/>
-            <a:ext cx="6125794" cy="1600438"/>
+            <a:off x="6126480" y="4328039"/>
+            <a:ext cx="5029200" cy="738664"/>
           </a:xfrm>
           <a:prstGeom prst="rect">
             <a:avLst/>
@@ -4619,7 +4619,7 @@
             </a:pPr>
             <a:r>
               <a:rPr lang="en-GB" sz="1400" b="1" dirty="0"/>
-              <a:t>Additional Technologies</a:t>
+              <a:t>Project Management technologies</a:t>
             </a:r>
           </a:p>
           <a:p>
@@ -4640,6 +4640,41 @@
             <a:r>
               <a:rPr lang="en-GB" sz="1400" dirty="0"/>
               <a:t>Jira – Agile Project Management</a:t>
+            </a:r>
+          </a:p>
+        </p:txBody>
+      </p:sp>
+      <p:sp>
+        <p:nvSpPr>
+          <p:cNvPr id="7" name="TextBox 6">
+            <a:extLst>
+              <a:ext uri="{FF2B5EF4-FFF2-40B4-BE49-F238E27FC236}">
+                <a16:creationId xmlns:a16="http://schemas.microsoft.com/office/drawing/2014/main" id="{3436077A-15B8-4831-B943-A9DEBCE8D2EC}"/>
+              </a:ext>
+            </a:extLst>
+          </p:cNvPr>
+          <p:cNvSpPr txBox="1"/>
+          <p:nvPr/>
+        </p:nvSpPr>
+        <p:spPr>
+          <a:xfrm>
+            <a:off x="1097280" y="4328039"/>
+            <a:ext cx="4998720" cy="1815882"/>
+          </a:xfrm>
+          <a:prstGeom prst="rect">
+            <a:avLst/>
+          </a:prstGeom>
+          <a:noFill/>
+        </p:spPr>
+        <p:txBody>
+          <a:bodyPr wrap="square">
+            <a:spAutoFit/>
+          </a:bodyPr>
+          <a:lstStyle/>
+          <a:p>
+            <a:r>
+              <a:rPr lang="en-GB" sz="1400" b="1" dirty="0"/>
+              <a:t>Program development technologies</a:t>
             </a:r>
           </a:p>
           <a:p>
@@ -4717,6 +4752,20 @@
                 <a:effectLst/>
               </a:rPr>
               <a:t>Java SQL database</a:t>
+            </a:r>
+          </a:p>
+          <a:p>
+            <a:pPr marL="285750" indent="-285750">
+              <a:buFont typeface="Arial" panose="020B0604020202020204" pitchFamily="34" charset="0"/>
+              <a:buChar char="•"/>
+            </a:pPr>
+            <a:r>
+              <a:rPr lang="en-GB" sz="1400" dirty="0">
+                <a:solidFill>
+                  <a:srgbClr val="000000"/>
+                </a:solidFill>
+              </a:rPr>
+              <a:t>Lombok – Autogenerate methods for java classes</a:t>
             </a:r>
             <a:endParaRPr lang="en-GB" sz="1400" dirty="0"/>
           </a:p>

</xml_diff>